<commit_message>
Updated slide template for Beamer and Keynote
</commit_message>
<xml_diff>
--- a/PPT/NESTLab Slide Template.pptx
+++ b/PPT/NESTLab Slide Template.pptx
@@ -169,7 +169,7 @@
 </file>
 
 <file path=ppt/charts/chart1.xml><?xml version="1.0" encoding="utf-8"?>
-<c:chartSpace xmlns:c="http://schemas.openxmlformats.org/drawingml/2006/chart" xmlns:a="http://schemas.openxmlformats.org/drawingml/2006/main" xmlns:r="http://schemas.openxmlformats.org/officeDocument/2006/relationships">
+<c:chartSpace xmlns:c="http://schemas.openxmlformats.org/drawingml/2006/chart" xmlns:a="http://schemas.openxmlformats.org/drawingml/2006/main" xmlns:r="http://schemas.openxmlformats.org/officeDocument/2006/relationships" xmlns:c16r2="http://schemas.microsoft.com/office/drawing/2015/06/chart">
   <c:date1904 val="0"/>
   <c:lang val="en-US"/>
   <c:roundedCorners val="0"/>
@@ -183,7 +183,6 @@
   </mc:AlternateContent>
   <c:chart>
     <c:title>
-      <c:layout/>
       <c:overlay val="0"/>
       <c:spPr>
         <a:noFill/>
@@ -285,6 +284,11 @@
               </c:numCache>
             </c:numRef>
           </c:val>
+          <c:extLst>
+            <c:ext xmlns:c16="http://schemas.microsoft.com/office/drawing/2014/chart" uri="{C3380CC4-5D6E-409C-BE32-E72D297353CC}">
+              <c16:uniqueId val="{00000000-3B3D-6F49-A85D-6447CF8885AA}"/>
+            </c:ext>
+          </c:extLst>
         </c:ser>
         <c:ser>
           <c:idx val="1"/>
@@ -340,7 +344,7 @@
                   <c:v>2.4</c:v>
                 </c:pt>
                 <c:pt idx="1">
-                  <c:v>4.4</c:v>
+                  <c:v>4.4000000000000004</c:v>
                 </c:pt>
                 <c:pt idx="2">
                   <c:v>1.8</c:v>
@@ -351,6 +355,11 @@
               </c:numCache>
             </c:numRef>
           </c:val>
+          <c:extLst>
+            <c:ext xmlns:c16="http://schemas.microsoft.com/office/drawing/2014/chart" uri="{C3380CC4-5D6E-409C-BE32-E72D297353CC}">
+              <c16:uniqueId val="{00000001-3B3D-6F49-A85D-6447CF8885AA}"/>
+            </c:ext>
+          </c:extLst>
         </c:ser>
         <c:ser>
           <c:idx val="2"/>
@@ -403,20 +412,25 @@
                 <c:formatCode>General</c:formatCode>
                 <c:ptCount val="4"/>
                 <c:pt idx="0">
-                  <c:v>2.0</c:v>
+                  <c:v>2</c:v>
                 </c:pt>
                 <c:pt idx="1">
-                  <c:v>2.0</c:v>
+                  <c:v>2</c:v>
                 </c:pt>
                 <c:pt idx="2">
-                  <c:v>3.0</c:v>
+                  <c:v>3</c:v>
                 </c:pt>
                 <c:pt idx="3">
-                  <c:v>5.0</c:v>
+                  <c:v>5</c:v>
                 </c:pt>
               </c:numCache>
             </c:numRef>
           </c:val>
+          <c:extLst>
+            <c:ext xmlns:c16="http://schemas.microsoft.com/office/drawing/2014/chart" uri="{C3380CC4-5D6E-409C-BE32-E72D297353CC}">
+              <c16:uniqueId val="{00000002-3B3D-6F49-A85D-6447CF8885AA}"/>
+            </c:ext>
+          </c:extLst>
         </c:ser>
         <c:dLbls>
           <c:showLegendKey val="0"/>
@@ -548,7 +562,6 @@
     </c:plotArea>
     <c:legend>
       <c:legendPos val="b"/>
-      <c:layout/>
       <c:overlay val="0"/>
       <c:spPr>
         <a:noFill/>
@@ -606,7 +619,7 @@
 </file>
 
 <file path=ppt/charts/chart2.xml><?xml version="1.0" encoding="utf-8"?>
-<c:chartSpace xmlns:c="http://schemas.openxmlformats.org/drawingml/2006/chart" xmlns:a="http://schemas.openxmlformats.org/drawingml/2006/main" xmlns:r="http://schemas.openxmlformats.org/officeDocument/2006/relationships">
+<c:chartSpace xmlns:c="http://schemas.openxmlformats.org/drawingml/2006/chart" xmlns:a="http://schemas.openxmlformats.org/drawingml/2006/main" xmlns:r="http://schemas.openxmlformats.org/officeDocument/2006/relationships" xmlns:c16r2="http://schemas.microsoft.com/office/drawing/2015/06/chart">
   <c:date1904 val="0"/>
   <c:lang val="en-US"/>
   <c:roundedCorners val="0"/>
@@ -620,7 +633,6 @@
   </mc:AlternateContent>
   <c:chart>
     <c:title>
-      <c:layout/>
       <c:overlay val="0"/>
       <c:spPr>
         <a:noFill/>
@@ -722,6 +734,11 @@
               </c:numCache>
             </c:numRef>
           </c:val>
+          <c:extLst>
+            <c:ext xmlns:c16="http://schemas.microsoft.com/office/drawing/2014/chart" uri="{C3380CC4-5D6E-409C-BE32-E72D297353CC}">
+              <c16:uniqueId val="{00000000-6AB7-384C-A2E8-7E450250894E}"/>
+            </c:ext>
+          </c:extLst>
         </c:ser>
         <c:ser>
           <c:idx val="1"/>
@@ -777,7 +794,7 @@
                   <c:v>2.4</c:v>
                 </c:pt>
                 <c:pt idx="1">
-                  <c:v>4.4</c:v>
+                  <c:v>4.4000000000000004</c:v>
                 </c:pt>
                 <c:pt idx="2">
                   <c:v>1.8</c:v>
@@ -788,6 +805,11 @@
               </c:numCache>
             </c:numRef>
           </c:val>
+          <c:extLst>
+            <c:ext xmlns:c16="http://schemas.microsoft.com/office/drawing/2014/chart" uri="{C3380CC4-5D6E-409C-BE32-E72D297353CC}">
+              <c16:uniqueId val="{00000001-6AB7-384C-A2E8-7E450250894E}"/>
+            </c:ext>
+          </c:extLst>
         </c:ser>
         <c:ser>
           <c:idx val="2"/>
@@ -840,20 +862,25 @@
                 <c:formatCode>General</c:formatCode>
                 <c:ptCount val="4"/>
                 <c:pt idx="0">
-                  <c:v>2.0</c:v>
+                  <c:v>2</c:v>
                 </c:pt>
                 <c:pt idx="1">
-                  <c:v>2.0</c:v>
+                  <c:v>2</c:v>
                 </c:pt>
                 <c:pt idx="2">
-                  <c:v>3.0</c:v>
+                  <c:v>3</c:v>
                 </c:pt>
                 <c:pt idx="3">
-                  <c:v>5.0</c:v>
+                  <c:v>5</c:v>
                 </c:pt>
               </c:numCache>
             </c:numRef>
           </c:val>
+          <c:extLst>
+            <c:ext xmlns:c16="http://schemas.microsoft.com/office/drawing/2014/chart" uri="{C3380CC4-5D6E-409C-BE32-E72D297353CC}">
+              <c16:uniqueId val="{00000002-6AB7-384C-A2E8-7E450250894E}"/>
+            </c:ext>
+          </c:extLst>
         </c:ser>
         <c:dLbls>
           <c:showLegendKey val="0"/>
@@ -985,7 +1012,6 @@
     </c:plotArea>
     <c:legend>
       <c:legendPos val="b"/>
-      <c:layout/>
       <c:overlay val="0"/>
       <c:spPr>
         <a:noFill/>
@@ -2214,7 +2240,7 @@
           <a:p>
             <a:fld id="{550449CD-19C8-44C0-A36B-1667EDB1312B}" type="datetimeFigureOut">
               <a:rPr lang="en-US" smtClean="0"/>
-              <a:t>10/5/17</a:t>
+              <a:t>10/14/19</a:t>
             </a:fld>
             <a:endParaRPr lang="en-US"/>
           </a:p>
@@ -2380,7 +2406,7 @@
             <a:fld id="{914C511E-AA3B-43E3-B946-406AB5E4C4BB}" type="datetimeFigureOut">
               <a:rPr lang="en-US" smtClean="0"/>
               <a:pPr/>
-              <a:t>10/5/17</a:t>
+              <a:t>10/14/19</a:t>
             </a:fld>
             <a:endParaRPr lang="en-US"/>
           </a:p>
@@ -2736,7 +2762,7 @@
         <p:spPr>
           <a:xfrm>
             <a:off x="457200" y="4041648"/>
-            <a:ext cx="6858000" cy="990600"/>
+            <a:ext cx="6858000" cy="1524000"/>
           </a:xfrm>
         </p:spPr>
         <p:txBody>
@@ -2908,22 +2934,34 @@
       </p:pic>
       <p:pic>
         <p:nvPicPr>
-          <p:cNvPr id="6" name="Picture 5"/>
+          <p:cNvPr id="8" name="Picture 7">
+            <a:extLst>
+              <a:ext uri="{FF2B5EF4-FFF2-40B4-BE49-F238E27FC236}">
+                <a16:creationId xmlns:a16="http://schemas.microsoft.com/office/drawing/2014/main" id="{42A82DAC-B0AA-EC41-8A97-E1F1692F8BC6}"/>
+              </a:ext>
+            </a:extLst>
+          </p:cNvPr>
           <p:cNvPicPr>
             <a:picLocks noChangeAspect="1"/>
           </p:cNvPicPr>
           <p:nvPr userDrawn="1"/>
         </p:nvPicPr>
         <p:blipFill>
-          <a:blip r:embed="rId4"/>
+          <a:blip r:embed="rId4">
+            <a:extLst>
+              <a:ext uri="{28A0092B-C50C-407E-A947-70E740481C1C}">
+                <a14:useLocalDpi xmlns:a14="http://schemas.microsoft.com/office/drawing/2010/main" val="0"/>
+              </a:ext>
+            </a:extLst>
+          </a:blip>
           <a:stretch>
             <a:fillRect/>
           </a:stretch>
         </p:blipFill>
         <p:spPr>
           <a:xfrm>
-            <a:off x="533400" y="5943600"/>
-            <a:ext cx="3352800" cy="722142"/>
+            <a:off x="457199" y="5780722"/>
+            <a:ext cx="4609664" cy="990600"/>
           </a:xfrm>
           <a:prstGeom prst="rect">
             <a:avLst/>
@@ -3223,65 +3261,6 @@
           </a:p>
         </p:txBody>
       </p:sp>
-      <p:sp>
-        <p:nvSpPr>
-          <p:cNvPr id="9" name="Footer Placeholder 2"/>
-          <p:cNvSpPr>
-            <a:spLocks noGrp="1"/>
-          </p:cNvSpPr>
-          <p:nvPr>
-            <p:ph type="ftr" sz="quarter" idx="3"/>
-          </p:nvPr>
-        </p:nvSpPr>
-        <p:spPr>
-          <a:xfrm>
-            <a:off x="457201" y="6159064"/>
-            <a:ext cx="5105400" cy="304800"/>
-          </a:xfrm>
-          <a:prstGeom prst="rect">
-            <a:avLst/>
-          </a:prstGeom>
-        </p:spPr>
-        <p:txBody>
-          <a:bodyPr/>
-          <a:lstStyle>
-            <a:lvl1pPr>
-              <a:defRPr sz="1600" b="0">
-                <a:solidFill>
-                  <a:schemeClr val="tx2"/>
-                </a:solidFill>
-              </a:defRPr>
-            </a:lvl1pPr>
-          </a:lstStyle>
-          <a:p>
-            <a:endParaRPr lang="en-US" dirty="0"/>
-          </a:p>
-        </p:txBody>
-      </p:sp>
-      <p:pic>
-        <p:nvPicPr>
-          <p:cNvPr id="11" name="Picture 10"/>
-          <p:cNvPicPr>
-            <a:picLocks noChangeAspect="1"/>
-          </p:cNvPicPr>
-          <p:nvPr userDrawn="1"/>
-        </p:nvPicPr>
-        <p:blipFill>
-          <a:blip r:embed="rId3"/>
-          <a:stretch>
-            <a:fillRect/>
-          </a:stretch>
-        </p:blipFill>
-        <p:spPr>
-          <a:xfrm>
-            <a:off x="457201" y="6463864"/>
-            <a:ext cx="1828801" cy="393895"/>
-          </a:xfrm>
-          <a:prstGeom prst="rect">
-            <a:avLst/>
-          </a:prstGeom>
-        </p:spPr>
-      </p:pic>
     </p:spTree>
   </p:cSld>
   <p:clrMapOvr>
@@ -3344,7 +3323,7 @@
         <p:spPr>
           <a:xfrm>
             <a:off x="457200" y="1371600"/>
-            <a:ext cx="8229600" cy="4648200"/>
+            <a:ext cx="8229600" cy="5016064"/>
           </a:xfrm>
         </p:spPr>
         <p:txBody>
@@ -3385,34 +3364,6 @@
               <a:t>Fifth level</a:t>
             </a:r>
             <a:endParaRPr lang="en-US"/>
-          </a:p>
-        </p:txBody>
-      </p:sp>
-      <p:sp>
-        <p:nvSpPr>
-          <p:cNvPr id="27" name="Rectangle 19"/>
-          <p:cNvSpPr>
-            <a:spLocks noGrp="1"/>
-          </p:cNvSpPr>
-          <p:nvPr>
-            <p:ph type="ftr" sz="quarter" idx="11"/>
-          </p:nvPr>
-        </p:nvSpPr>
-        <p:spPr>
-          <a:xfrm>
-            <a:off x="457198" y="6082744"/>
-            <a:ext cx="8229601" cy="304800"/>
-          </a:xfrm>
-        </p:spPr>
-        <p:txBody>
-          <a:bodyPr/>
-          <a:lstStyle/>
-          <a:p>
-            <a:r>
-              <a:rPr lang="en-US" dirty="0" smtClean="0"/>
-              <a:t>Footer</a:t>
-            </a:r>
-            <a:endParaRPr lang="en-US" dirty="0"/>
           </a:p>
         </p:txBody>
       </p:sp>
@@ -3440,30 +3391,6 @@
           </a:p>
         </p:txBody>
       </p:sp>
-      <p:pic>
-        <p:nvPicPr>
-          <p:cNvPr id="6" name="Picture 5"/>
-          <p:cNvPicPr>
-            <a:picLocks noChangeAspect="1"/>
-          </p:cNvPicPr>
-          <p:nvPr userDrawn="1"/>
-        </p:nvPicPr>
-        <p:blipFill>
-          <a:blip r:embed="rId2"/>
-          <a:stretch>
-            <a:fillRect/>
-          </a:stretch>
-        </p:blipFill>
-        <p:spPr>
-          <a:xfrm>
-            <a:off x="457198" y="6387905"/>
-            <a:ext cx="1828801" cy="393895"/>
-          </a:xfrm>
-          <a:prstGeom prst="rect">
-            <a:avLst/>
-          </a:prstGeom>
-        </p:spPr>
-      </p:pic>
     </p:spTree>
     <p:extLst>
       <p:ext uri="{BB962C8B-B14F-4D97-AF65-F5344CB8AC3E}">
@@ -3530,7 +3457,7 @@
         <p:spPr>
           <a:xfrm>
             <a:off x="762000" y="1371600"/>
-            <a:ext cx="3657600" cy="4648200"/>
+            <a:ext cx="3657600" cy="5016064"/>
           </a:xfrm>
         </p:spPr>
         <p:txBody>
@@ -3616,7 +3543,7 @@
         <p:spPr>
           <a:xfrm>
             <a:off x="4648200" y="1371600"/>
-            <a:ext cx="3657600" cy="4648200"/>
+            <a:ext cx="3657600" cy="5016064"/>
           </a:xfrm>
         </p:spPr>
         <p:txBody>
@@ -3713,54 +3640,6 @@
           </a:p>
         </p:txBody>
       </p:sp>
-      <p:sp>
-        <p:nvSpPr>
-          <p:cNvPr id="6" name="Rectangle 19"/>
-          <p:cNvSpPr>
-            <a:spLocks noGrp="1"/>
-          </p:cNvSpPr>
-          <p:nvPr>
-            <p:ph type="ftr" sz="quarter" idx="11"/>
-          </p:nvPr>
-        </p:nvSpPr>
-        <p:spPr>
-          <a:xfrm>
-            <a:off x="457200" y="6082864"/>
-            <a:ext cx="7848600" cy="304800"/>
-          </a:xfrm>
-        </p:spPr>
-        <p:txBody>
-          <a:bodyPr/>
-          <a:lstStyle/>
-          <a:p>
-            <a:endParaRPr lang="en-US" dirty="0"/>
-          </a:p>
-        </p:txBody>
-      </p:sp>
-      <p:pic>
-        <p:nvPicPr>
-          <p:cNvPr id="8" name="Picture 7"/>
-          <p:cNvPicPr>
-            <a:picLocks noChangeAspect="1"/>
-          </p:cNvPicPr>
-          <p:nvPr userDrawn="1"/>
-        </p:nvPicPr>
-        <p:blipFill>
-          <a:blip r:embed="rId2"/>
-          <a:stretch>
-            <a:fillRect/>
-          </a:stretch>
-        </p:blipFill>
-        <p:spPr>
-          <a:xfrm>
-            <a:off x="457198" y="6387905"/>
-            <a:ext cx="1828801" cy="393895"/>
-          </a:xfrm>
-          <a:prstGeom prst="rect">
-            <a:avLst/>
-          </a:prstGeom>
-        </p:spPr>
-      </p:pic>
       <p:cxnSp>
         <p:nvCxnSpPr>
           <p:cNvPr id="9" name="Straight Connector 8"/>
@@ -3769,7 +3648,7 @@
         </p:nvCxnSpPr>
         <p:spPr>
           <a:xfrm flipH="1">
-            <a:off x="4533106" y="1699251"/>
+            <a:off x="4533106" y="1871757"/>
             <a:ext cx="1588" cy="4015749"/>
           </a:xfrm>
           <a:prstGeom prst="line">
@@ -3860,7 +3739,7 @@
         <p:spPr>
           <a:xfrm>
             <a:off x="762000" y="2136498"/>
-            <a:ext cx="3657600" cy="3883302"/>
+            <a:ext cx="3657600" cy="4251166"/>
           </a:xfrm>
         </p:spPr>
         <p:txBody>
@@ -3946,7 +3825,7 @@
         <p:spPr>
           <a:xfrm>
             <a:off x="4648200" y="2136498"/>
-            <a:ext cx="3657600" cy="3883302"/>
+            <a:ext cx="3657600" cy="4251166"/>
           </a:xfrm>
         </p:spPr>
         <p:txBody>
@@ -4043,54 +3922,6 @@
           </a:p>
         </p:txBody>
       </p:sp>
-      <p:sp>
-        <p:nvSpPr>
-          <p:cNvPr id="6" name="Rectangle 19"/>
-          <p:cNvSpPr>
-            <a:spLocks noGrp="1"/>
-          </p:cNvSpPr>
-          <p:nvPr>
-            <p:ph type="ftr" sz="quarter" idx="11"/>
-          </p:nvPr>
-        </p:nvSpPr>
-        <p:spPr>
-          <a:xfrm>
-            <a:off x="457200" y="6082864"/>
-            <a:ext cx="7848600" cy="304800"/>
-          </a:xfrm>
-        </p:spPr>
-        <p:txBody>
-          <a:bodyPr/>
-          <a:lstStyle/>
-          <a:p>
-            <a:endParaRPr lang="en-US" dirty="0"/>
-          </a:p>
-        </p:txBody>
-      </p:sp>
-      <p:pic>
-        <p:nvPicPr>
-          <p:cNvPr id="8" name="Picture 7"/>
-          <p:cNvPicPr>
-            <a:picLocks noChangeAspect="1"/>
-          </p:cNvPicPr>
-          <p:nvPr userDrawn="1"/>
-        </p:nvPicPr>
-        <p:blipFill>
-          <a:blip r:embed="rId2"/>
-          <a:stretch>
-            <a:fillRect/>
-          </a:stretch>
-        </p:blipFill>
-        <p:spPr>
-          <a:xfrm>
-            <a:off x="457198" y="6387905"/>
-            <a:ext cx="1828801" cy="393895"/>
-          </a:xfrm>
-          <a:prstGeom prst="rect">
-            <a:avLst/>
-          </a:prstGeom>
-        </p:spPr>
-      </p:pic>
       <p:cxnSp>
         <p:nvCxnSpPr>
           <p:cNvPr id="9" name="Straight Connector 8"/>
@@ -4099,7 +3930,7 @@
         </p:nvCxnSpPr>
         <p:spPr>
           <a:xfrm flipH="1">
-            <a:off x="4533106" y="1699251"/>
+            <a:off x="4533106" y="1816617"/>
             <a:ext cx="1588" cy="4015749"/>
           </a:xfrm>
           <a:prstGeom prst="line">
@@ -4334,7 +4165,7 @@
         <p:spPr>
           <a:xfrm>
             <a:off x="457199" y="1371600"/>
-            <a:ext cx="3440235" cy="4648200"/>
+            <a:ext cx="3440235" cy="5016064"/>
           </a:xfrm>
         </p:spPr>
         <p:txBody>
@@ -4373,10 +4204,9 @@
           <a:p>
             <a:pPr lvl="0"/>
             <a:r>
-              <a:rPr lang="en-US" dirty="0" smtClean="0"/>
+              <a:rPr lang="en-US" dirty="0"/>
               <a:t>Click to edit description</a:t>
             </a:r>
-            <a:endParaRPr lang="en-US" dirty="0"/>
           </a:p>
         </p:txBody>
       </p:sp>
@@ -4393,7 +4223,7 @@
         <p:spPr>
           <a:xfrm>
             <a:off x="4038600" y="1371600"/>
-            <a:ext cx="4648200" cy="4648200"/>
+            <a:ext cx="4648200" cy="5016064"/>
           </a:xfrm>
         </p:spPr>
         <p:txBody>
@@ -4432,10 +4262,9 @@
           <a:p>
             <a:pPr lvl="0"/>
             <a:r>
-              <a:rPr lang="en-US" dirty="0" smtClean="0"/>
+              <a:rPr lang="en-US" dirty="0"/>
               <a:t>Visuals </a:t>
             </a:r>
-            <a:endParaRPr lang="en-US" dirty="0"/>
           </a:p>
         </p:txBody>
       </p:sp>
@@ -4463,54 +4292,6 @@
           </a:p>
         </p:txBody>
       </p:sp>
-      <p:sp>
-        <p:nvSpPr>
-          <p:cNvPr id="6" name="Rectangle 19"/>
-          <p:cNvSpPr>
-            <a:spLocks noGrp="1"/>
-          </p:cNvSpPr>
-          <p:nvPr>
-            <p:ph type="ftr" sz="quarter" idx="11"/>
-          </p:nvPr>
-        </p:nvSpPr>
-        <p:spPr>
-          <a:xfrm>
-            <a:off x="457200" y="6082864"/>
-            <a:ext cx="8229600" cy="304800"/>
-          </a:xfrm>
-        </p:spPr>
-        <p:txBody>
-          <a:bodyPr/>
-          <a:lstStyle/>
-          <a:p>
-            <a:endParaRPr lang="en-US" dirty="0"/>
-          </a:p>
-        </p:txBody>
-      </p:sp>
-      <p:pic>
-        <p:nvPicPr>
-          <p:cNvPr id="8" name="Picture 7"/>
-          <p:cNvPicPr>
-            <a:picLocks noChangeAspect="1"/>
-          </p:cNvPicPr>
-          <p:nvPr userDrawn="1"/>
-        </p:nvPicPr>
-        <p:blipFill>
-          <a:blip r:embed="rId2"/>
-          <a:stretch>
-            <a:fillRect/>
-          </a:stretch>
-        </p:blipFill>
-        <p:spPr>
-          <a:xfrm>
-            <a:off x="457198" y="6387905"/>
-            <a:ext cx="1828801" cy="393895"/>
-          </a:xfrm>
-          <a:prstGeom prst="rect">
-            <a:avLst/>
-          </a:prstGeom>
-        </p:spPr>
-      </p:pic>
       <p:cxnSp>
         <p:nvCxnSpPr>
           <p:cNvPr id="9" name="Straight Connector 8"/>
@@ -4519,7 +4300,7 @@
         </p:nvCxnSpPr>
         <p:spPr>
           <a:xfrm flipH="1">
-            <a:off x="3967223" y="1605057"/>
+            <a:off x="3967223" y="1871757"/>
             <a:ext cx="1588" cy="4015749"/>
           </a:xfrm>
           <a:prstGeom prst="line">
@@ -4610,7 +4391,7 @@
         <p:spPr>
           <a:xfrm>
             <a:off x="457199" y="1371600"/>
-            <a:ext cx="4648201" cy="4648200"/>
+            <a:ext cx="4648201" cy="5016064"/>
           </a:xfrm>
         </p:spPr>
         <p:txBody>
@@ -4683,7 +4464,7 @@
               <a:defRPr/>
             </a:pPr>
             <a:r>
-              <a:rPr lang="en-US" dirty="0" smtClean="0"/>
+              <a:rPr lang="en-US" dirty="0"/>
               <a:t>Visuals </a:t>
             </a:r>
           </a:p>
@@ -4706,7 +4487,7 @@
         <p:spPr>
           <a:xfrm>
             <a:off x="5259388" y="1371600"/>
-            <a:ext cx="3427412" cy="4648200"/>
+            <a:ext cx="3427412" cy="5016064"/>
           </a:xfrm>
         </p:spPr>
         <p:txBody>
@@ -4779,10 +4560,9 @@
               <a:defRPr/>
             </a:pPr>
             <a:r>
-              <a:rPr lang="en-US" dirty="0" smtClean="0"/>
+              <a:rPr lang="en-US" dirty="0"/>
               <a:t>Click to edit description</a:t>
             </a:r>
-            <a:endParaRPr lang="en-US" dirty="0"/>
           </a:p>
         </p:txBody>
       </p:sp>
@@ -4810,54 +4590,6 @@
           </a:p>
         </p:txBody>
       </p:sp>
-      <p:sp>
-        <p:nvSpPr>
-          <p:cNvPr id="6" name="Rectangle 19"/>
-          <p:cNvSpPr>
-            <a:spLocks noGrp="1"/>
-          </p:cNvSpPr>
-          <p:nvPr>
-            <p:ph type="ftr" sz="quarter" idx="11"/>
-          </p:nvPr>
-        </p:nvSpPr>
-        <p:spPr>
-          <a:xfrm>
-            <a:off x="457200" y="6082864"/>
-            <a:ext cx="8229600" cy="304800"/>
-          </a:xfrm>
-        </p:spPr>
-        <p:txBody>
-          <a:bodyPr/>
-          <a:lstStyle/>
-          <a:p>
-            <a:endParaRPr lang="en-US" dirty="0"/>
-          </a:p>
-        </p:txBody>
-      </p:sp>
-      <p:pic>
-        <p:nvPicPr>
-          <p:cNvPr id="8" name="Picture 7"/>
-          <p:cNvPicPr>
-            <a:picLocks noChangeAspect="1"/>
-          </p:cNvPicPr>
-          <p:nvPr userDrawn="1"/>
-        </p:nvPicPr>
-        <p:blipFill>
-          <a:blip r:embed="rId2"/>
-          <a:stretch>
-            <a:fillRect/>
-          </a:stretch>
-        </p:blipFill>
-        <p:spPr>
-          <a:xfrm>
-            <a:off x="457198" y="6387905"/>
-            <a:ext cx="1828801" cy="393895"/>
-          </a:xfrm>
-          <a:prstGeom prst="rect">
-            <a:avLst/>
-          </a:prstGeom>
-        </p:spPr>
-      </p:pic>
       <p:cxnSp>
         <p:nvCxnSpPr>
           <p:cNvPr id="9" name="Straight Connector 8"/>
@@ -4866,7 +4598,7 @@
         </p:nvCxnSpPr>
         <p:spPr>
           <a:xfrm flipH="1">
-            <a:off x="5177742" y="1687825"/>
+            <a:off x="5180012" y="1871757"/>
             <a:ext cx="1588" cy="4015749"/>
           </a:xfrm>
           <a:prstGeom prst="line">
@@ -5181,108 +4913,6 @@
           </a:p>
         </p:txBody>
       </p:sp>
-      <p:sp>
-        <p:nvSpPr>
-          <p:cNvPr id="10" name="TextBox 9"/>
-          <p:cNvSpPr txBox="1"/>
-          <p:nvPr userDrawn="1"/>
-        </p:nvSpPr>
-        <p:spPr>
-          <a:xfrm>
-            <a:off x="5486400" y="6400800"/>
-            <a:ext cx="3352800" cy="369332"/>
-          </a:xfrm>
-          <a:prstGeom prst="rect">
-            <a:avLst/>
-          </a:prstGeom>
-          <a:noFill/>
-          <a:ln>
-            <a:noFill/>
-          </a:ln>
-        </p:spPr>
-        <p:txBody>
-          <a:bodyPr wrap="square" rtlCol="0">
-            <a:spAutoFit/>
-          </a:bodyPr>
-          <a:lstStyle/>
-          <a:p>
-            <a:pPr algn="r"/>
-            <a:r>
-              <a:rPr lang="en-US" dirty="0">
-                <a:solidFill>
-                  <a:schemeClr val="bg2"/>
-                </a:solidFill>
-                <a:latin typeface="Times New Roman" pitchFamily="18" charset="0"/>
-                <a:cs typeface="Times New Roman" pitchFamily="18" charset="0"/>
-              </a:rPr>
-              <a:t>Worcester Polytechnic Institute</a:t>
-            </a:r>
-          </a:p>
-        </p:txBody>
-      </p:sp>
-      <p:sp>
-        <p:nvSpPr>
-          <p:cNvPr id="13" name="Footer Placeholder 2"/>
-          <p:cNvSpPr>
-            <a:spLocks noGrp="1"/>
-          </p:cNvSpPr>
-          <p:nvPr>
-            <p:ph type="ftr" sz="quarter" idx="3"/>
-          </p:nvPr>
-        </p:nvSpPr>
-        <p:spPr>
-          <a:xfrm>
-            <a:off x="457200" y="6083707"/>
-            <a:ext cx="8229600" cy="304800"/>
-          </a:xfrm>
-          <a:prstGeom prst="rect">
-            <a:avLst/>
-          </a:prstGeom>
-        </p:spPr>
-        <p:txBody>
-          <a:bodyPr/>
-          <a:lstStyle>
-            <a:lvl1pPr>
-              <a:defRPr sz="1600" b="0">
-                <a:solidFill>
-                  <a:schemeClr val="tx2"/>
-                </a:solidFill>
-              </a:defRPr>
-            </a:lvl1pPr>
-          </a:lstStyle>
-          <a:p>
-            <a:r>
-              <a:rPr lang="en-US" dirty="0" smtClean="0"/>
-              <a:t>footer</a:t>
-            </a:r>
-            <a:endParaRPr lang="en-US" dirty="0"/>
-          </a:p>
-        </p:txBody>
-      </p:sp>
-      <p:pic>
-        <p:nvPicPr>
-          <p:cNvPr id="8" name="Picture 7"/>
-          <p:cNvPicPr>
-            <a:picLocks noChangeAspect="1"/>
-          </p:cNvPicPr>
-          <p:nvPr userDrawn="1"/>
-        </p:nvPicPr>
-        <p:blipFill>
-          <a:blip r:embed="rId10"/>
-          <a:stretch>
-            <a:fillRect/>
-          </a:stretch>
-        </p:blipFill>
-        <p:spPr>
-          <a:xfrm>
-            <a:off x="457198" y="6387905"/>
-            <a:ext cx="1828801" cy="393895"/>
-          </a:xfrm>
-          <a:prstGeom prst="rect">
-            <a:avLst/>
-          </a:prstGeom>
-        </p:spPr>
-      </p:pic>
     </p:spTree>
   </p:cSld>
   <p:clrMap bg1="lt1" tx1="dk1" bg2="lt2" tx2="dk2" accent1="accent1" accent2="accent2" accent3="accent3" accent4="accent4" accent5="accent5" accent6="accent6" hlink="hlink" folHlink="folHlink"/>
@@ -5684,17 +5314,16 @@
           <a:lstStyle/>
           <a:p>
             <a:r>
-              <a:rPr lang="en-US" dirty="0" smtClean="0"/>
+              <a:rPr lang="en-US" dirty="0"/>
               <a:t>Title Slide</a:t>
             </a:r>
             <a:br>
-              <a:rPr lang="en-US" dirty="0" smtClean="0"/>
+              <a:rPr lang="en-US" dirty="0"/>
             </a:br>
             <a:r>
-              <a:rPr lang="en-US" sz="2000" dirty="0" smtClean="0"/>
+              <a:rPr lang="en-US" sz="2000" dirty="0"/>
               <a:t>Author</a:t>
             </a:r>
-            <a:endParaRPr lang="en-US" sz="2000" dirty="0"/>
           </a:p>
         </p:txBody>
       </p:sp>
@@ -5714,10 +5343,9 @@
           <a:lstStyle/>
           <a:p>
             <a:r>
-              <a:rPr lang="en-US" dirty="0" smtClean="0"/>
+              <a:rPr lang="en-US" dirty="0"/>
               <a:t>Presenter</a:t>
             </a:r>
-            <a:endParaRPr lang="en-US" dirty="0"/>
           </a:p>
         </p:txBody>
       </p:sp>
@@ -5767,10 +5395,9 @@
           <a:lstStyle/>
           <a:p>
             <a:r>
-              <a:rPr lang="en-US" dirty="0" smtClean="0"/>
+              <a:rPr lang="en-US" dirty="0"/>
               <a:t>Section Title</a:t>
             </a:r>
-            <a:endParaRPr lang="en-US" dirty="0"/>
           </a:p>
         </p:txBody>
       </p:sp>
@@ -5790,10 +5417,9 @@
           <a:lstStyle/>
           <a:p>
             <a:r>
-              <a:rPr lang="en-US" dirty="0" smtClean="0"/>
+              <a:rPr lang="en-US" dirty="0"/>
               <a:t>Tags</a:t>
             </a:r>
-            <a:endParaRPr lang="en-US" dirty="0"/>
           </a:p>
         </p:txBody>
       </p:sp>
@@ -5828,10 +5454,18 @@
             <a:spLocks noGrp="1"/>
           </p:cNvSpPr>
           <p:nvPr>
-            <p:ph type="ftr" sz="quarter" idx="3"/>
+            <p:ph type="ftr" sz="quarter" idx="4294967295"/>
           </p:nvPr>
         </p:nvSpPr>
-        <p:spPr/>
+        <p:spPr>
+          <a:xfrm>
+            <a:off x="457201" y="6159064"/>
+            <a:ext cx="5105400" cy="304800"/>
+          </a:xfrm>
+          <a:prstGeom prst="rect">
+            <a:avLst/>
+          </a:prstGeom>
+        </p:spPr>
         <p:txBody>
           <a:bodyPr/>
           <a:lstStyle/>
@@ -5886,10 +5520,9 @@
           <a:lstStyle/>
           <a:p>
             <a:r>
-              <a:rPr lang="en-US" dirty="0" smtClean="0"/>
+              <a:rPr lang="en-US" dirty="0"/>
               <a:t>Information</a:t>
             </a:r>
-            <a:endParaRPr lang="en-US" dirty="0"/>
           </a:p>
         </p:txBody>
       </p:sp>
@@ -5909,10 +5542,9 @@
           <a:lstStyle/>
           <a:p>
             <a:r>
-              <a:rPr lang="en-US" dirty="0" smtClean="0"/>
+              <a:rPr lang="en-US" dirty="0"/>
               <a:t>Explanation</a:t>
             </a:r>
-            <a:endParaRPr lang="en-US" dirty="0"/>
           </a:p>
         </p:txBody>
       </p:sp>
@@ -5923,10 +5555,18 @@
             <a:spLocks noGrp="1"/>
           </p:cNvSpPr>
           <p:nvPr>
-            <p:ph type="ftr" sz="quarter" idx="11"/>
+            <p:ph type="ftr" sz="quarter" idx="4294967295"/>
           </p:nvPr>
         </p:nvSpPr>
-        <p:spPr/>
+        <p:spPr>
+          <a:xfrm>
+            <a:off x="457198" y="6082744"/>
+            <a:ext cx="8229601" cy="304800"/>
+          </a:xfrm>
+          <a:prstGeom prst="rect">
+            <a:avLst/>
+          </a:prstGeom>
+        </p:spPr>
         <p:txBody>
           <a:bodyPr/>
           <a:lstStyle/>
@@ -6005,10 +5645,9 @@
           <a:lstStyle/>
           <a:p>
             <a:r>
-              <a:rPr lang="en-US" dirty="0" smtClean="0"/>
+              <a:rPr lang="en-US" dirty="0"/>
               <a:t>Comparison</a:t>
             </a:r>
-            <a:endParaRPr lang="en-US" dirty="0"/>
           </a:p>
         </p:txBody>
       </p:sp>
@@ -6028,10 +5667,9 @@
           <a:lstStyle/>
           <a:p>
             <a:r>
-              <a:rPr lang="en-US" dirty="0" smtClean="0"/>
+              <a:rPr lang="en-US" dirty="0"/>
               <a:t>Type 1</a:t>
             </a:r>
-            <a:endParaRPr lang="en-US" dirty="0"/>
           </a:p>
         </p:txBody>
       </p:sp>
@@ -6051,10 +5689,9 @@
           <a:lstStyle/>
           <a:p>
             <a:r>
-              <a:rPr lang="en-US" dirty="0" smtClean="0"/>
+              <a:rPr lang="en-US" dirty="0"/>
               <a:t>Type 2</a:t>
             </a:r>
-            <a:endParaRPr lang="en-US" dirty="0"/>
           </a:p>
         </p:txBody>
       </p:sp>
@@ -6089,16 +5726,24 @@
             <a:spLocks noGrp="1"/>
           </p:cNvSpPr>
           <p:nvPr>
-            <p:ph type="ftr" sz="quarter" idx="11"/>
+            <p:ph type="ftr" sz="quarter" idx="4294967295"/>
           </p:nvPr>
         </p:nvSpPr>
-        <p:spPr/>
+        <p:spPr>
+          <a:xfrm>
+            <a:off x="457200" y="6082864"/>
+            <a:ext cx="7848600" cy="304800"/>
+          </a:xfrm>
+          <a:prstGeom prst="rect">
+            <a:avLst/>
+          </a:prstGeom>
+        </p:spPr>
         <p:txBody>
           <a:bodyPr/>
           <a:lstStyle/>
           <a:p>
             <a:r>
-              <a:rPr lang="en-US" smtClean="0"/>
+              <a:rPr lang="en-US"/>
               <a:t>Footer</a:t>
             </a:r>
             <a:endParaRPr lang="en-US" dirty="0"/>
@@ -6151,10 +5796,9 @@
           <a:lstStyle/>
           <a:p>
             <a:r>
-              <a:rPr lang="en-US" dirty="0" smtClean="0"/>
+              <a:rPr lang="en-US" dirty="0"/>
               <a:t>Comparison</a:t>
             </a:r>
-            <a:endParaRPr lang="en-US" dirty="0"/>
           </a:p>
         </p:txBody>
       </p:sp>
@@ -6174,10 +5818,9 @@
           <a:lstStyle/>
           <a:p>
             <a:r>
-              <a:rPr lang="en-US" dirty="0" smtClean="0"/>
+              <a:rPr lang="en-US" dirty="0"/>
               <a:t>Information</a:t>
             </a:r>
-            <a:endParaRPr lang="en-US" dirty="0"/>
           </a:p>
         </p:txBody>
       </p:sp>
@@ -6197,10 +5840,9 @@
           <a:lstStyle/>
           <a:p>
             <a:r>
-              <a:rPr lang="en-US" dirty="0" smtClean="0"/>
+              <a:rPr lang="en-US" dirty="0"/>
               <a:t>Information</a:t>
             </a:r>
-            <a:endParaRPr lang="en-US" dirty="0"/>
           </a:p>
         </p:txBody>
       </p:sp>
@@ -6235,10 +5877,18 @@
             <a:spLocks noGrp="1"/>
           </p:cNvSpPr>
           <p:nvPr>
-            <p:ph type="ftr" sz="quarter" idx="11"/>
+            <p:ph type="ftr" sz="quarter" idx="4294967295"/>
           </p:nvPr>
         </p:nvSpPr>
-        <p:spPr/>
+        <p:spPr>
+          <a:xfrm>
+            <a:off x="457200" y="6082864"/>
+            <a:ext cx="7848600" cy="304800"/>
+          </a:xfrm>
+          <a:prstGeom prst="rect">
+            <a:avLst/>
+          </a:prstGeom>
+        </p:spPr>
         <p:txBody>
           <a:bodyPr/>
           <a:lstStyle/>
@@ -6263,10 +5913,9 @@
           <a:lstStyle/>
           <a:p>
             <a:r>
-              <a:rPr lang="en-US" dirty="0" smtClean="0"/>
+              <a:rPr lang="en-US" dirty="0"/>
               <a:t>Type 1</a:t>
             </a:r>
-            <a:endParaRPr lang="en-US" dirty="0"/>
           </a:p>
         </p:txBody>
       </p:sp>
@@ -6286,10 +5935,9 @@
           <a:lstStyle/>
           <a:p>
             <a:r>
-              <a:rPr lang="en-US" dirty="0" smtClean="0"/>
+              <a:rPr lang="en-US" dirty="0"/>
               <a:t>Type 2</a:t>
             </a:r>
-            <a:endParaRPr lang="en-US" dirty="0"/>
           </a:p>
         </p:txBody>
       </p:sp>
@@ -6339,10 +5987,9 @@
           <a:lstStyle/>
           <a:p>
             <a:r>
-              <a:rPr lang="en-US" dirty="0" smtClean="0"/>
+              <a:rPr lang="en-US" dirty="0"/>
               <a:t>Content Visual</a:t>
             </a:r>
-            <a:endParaRPr lang="en-US" dirty="0"/>
           </a:p>
         </p:txBody>
       </p:sp>
@@ -6362,10 +6009,9 @@
           <a:lstStyle/>
           <a:p>
             <a:r>
-              <a:rPr lang="en-US" dirty="0" smtClean="0"/>
+              <a:rPr lang="en-US" dirty="0"/>
               <a:t>Content</a:t>
             </a:r>
-            <a:endParaRPr lang="en-US" dirty="0"/>
           </a:p>
         </p:txBody>
       </p:sp>
@@ -6425,10 +6071,18 @@
             <a:spLocks noGrp="1"/>
           </p:cNvSpPr>
           <p:nvPr>
-            <p:ph type="ftr" sz="quarter" idx="11"/>
+            <p:ph type="ftr" sz="quarter" idx="4294967295"/>
           </p:nvPr>
         </p:nvSpPr>
-        <p:spPr/>
+        <p:spPr>
+          <a:xfrm>
+            <a:off x="457200" y="6082864"/>
+            <a:ext cx="8229600" cy="304800"/>
+          </a:xfrm>
+          <a:prstGeom prst="rect">
+            <a:avLst/>
+          </a:prstGeom>
+        </p:spPr>
         <p:txBody>
           <a:bodyPr/>
           <a:lstStyle/>
@@ -6483,10 +6137,9 @@
           <a:lstStyle/>
           <a:p>
             <a:r>
-              <a:rPr lang="en-US" dirty="0" smtClean="0"/>
+              <a:rPr lang="en-US" dirty="0"/>
               <a:t>Visuals Content</a:t>
             </a:r>
-            <a:endParaRPr lang="en-US" dirty="0"/>
           </a:p>
         </p:txBody>
       </p:sp>
@@ -6506,10 +6159,9 @@
           <a:lstStyle/>
           <a:p>
             <a:r>
-              <a:rPr lang="en-US" dirty="0" smtClean="0"/>
+              <a:rPr lang="en-US" dirty="0"/>
               <a:t>Content</a:t>
             </a:r>
-            <a:endParaRPr lang="en-US" dirty="0"/>
           </a:p>
         </p:txBody>
       </p:sp>
@@ -6544,10 +6196,18 @@
             <a:spLocks noGrp="1"/>
           </p:cNvSpPr>
           <p:nvPr>
-            <p:ph type="ftr" sz="quarter" idx="11"/>
+            <p:ph type="ftr" sz="quarter" idx="4294967295"/>
           </p:nvPr>
         </p:nvSpPr>
-        <p:spPr/>
+        <p:spPr>
+          <a:xfrm>
+            <a:off x="457200" y="6082864"/>
+            <a:ext cx="8229600" cy="304800"/>
+          </a:xfrm>
+          <a:prstGeom prst="rect">
+            <a:avLst/>
+          </a:prstGeom>
+        </p:spPr>
         <p:txBody>
           <a:bodyPr/>
           <a:lstStyle/>

</xml_diff>